<commit_message>
Changed colors in charts and added Ashni's slides to presentation with notes
</commit_message>
<xml_diff>
--- a/Presentation-v3.pptx
+++ b/Presentation-v3.pptx
@@ -5,14 +5,15 @@
     <p:sldMasterId id="2147483648" r:id="rId1"/>
   </p:sldMasterIdLst>
   <p:notesMasterIdLst>
-    <p:notesMasterId r:id="rId7"/>
+    <p:notesMasterId r:id="rId8"/>
   </p:notesMasterIdLst>
   <p:sldIdLst>
     <p:sldId id="265" r:id="rId2"/>
     <p:sldId id="262" r:id="rId3"/>
     <p:sldId id="261" r:id="rId4"/>
     <p:sldId id="263" r:id="rId5"/>
-    <p:sldId id="264" r:id="rId6"/>
+    <p:sldId id="256" r:id="rId6"/>
+    <p:sldId id="257" r:id="rId7"/>
   </p:sldIdLst>
   <p:sldSz cx="12192000" cy="6858000"/>
   <p:notesSz cx="6858000" cy="9144000"/>
@@ -201,7 +202,7 @@
           <a:p>
             <a:fld id="{670C9F3B-FF2E-4C84-91B4-62947A895780}" type="datetimeFigureOut">
               <a:rPr lang="en-US" smtClean="0"/>
-              <a:t>9/17/2020</a:t>
+              <a:t>9/18/2020</a:t>
             </a:fld>
             <a:endParaRPr lang="en-US"/>
           </a:p>
@@ -601,15 +602,7 @@
           <a:p>
             <a:r>
               <a:rPr lang="en-US" dirty="0"/>
-              <a:t>One way to look at the data—the most usual way—is simply to look at the change in representation over time—has it gone up or down.  In these charts the blue line is share of the total workforce, the aqua line is percentage of professional jobs held by people in the population group, the green line is managerial positions, and the teal line is </a:t>
-            </a:r>
-            <a:r>
-              <a:rPr lang="en-US" dirty="0" err="1"/>
-              <a:t>ceos</a:t>
-            </a:r>
-            <a:r>
-              <a:rPr lang="en-US" dirty="0"/>
-              <a:t>. They show us that over the past tend years representation of African-</a:t>
+              <a:t>These charts show each population group’s share of jobs in the total workforce and their share of professional, managerial, and chief executive positions.  Over the past ten years representation of African-</a:t>
             </a:r>
             <a:r>
               <a:rPr lang="en-US" dirty="0" err="1"/>
@@ -625,16 +618,7 @@
             </a:r>
             <a:r>
               <a:rPr lang="en-US" dirty="0"/>
-              <a:t>, and Asians as generally gone up at least slightly, while movement among women has been flatter.</a:t>
-            </a:r>
-          </a:p>
-          <a:p>
-            <a:endParaRPr lang="en-US" dirty="0"/>
-          </a:p>
-          <a:p>
-            <a:r>
-              <a:rPr lang="en-US" dirty="0"/>
-              <a:t>But the real story isn’t how much the lines go up; the real story is between the lines—literally, the space between the lines.  Look for example at the charts for </a:t>
+              <a:t>, and Asians has generally gone up at least slightly, while movement among women has been flatter.  But the real story is between the lines—literally, the space between the lines.  For example, we can see that </a:t>
             </a:r>
             <a:r>
               <a:rPr lang="en-US" dirty="0" err="1"/>
@@ -642,15 +626,7 @@
             </a:r>
             <a:r>
               <a:rPr lang="en-US" dirty="0"/>
-              <a:t> workers.  We can see from the green and </a:t>
-            </a:r>
-            <a:r>
-              <a:rPr lang="en-US" dirty="0" err="1"/>
-              <a:t>acqua</a:t>
-            </a:r>
-            <a:r>
-              <a:rPr lang="en-US" dirty="0"/>
-              <a:t> lines that their share of managerial and professional jobs has gone up in the past ten years.  But so has their share of the workforce as a whole.  If all things were truly equal, we would expect that </a:t>
+              <a:t> workers’ share of managerial and professional jobs has gone up in the past ten years.  But so has their share of the workforce as a whole.  If all things were truly equal, we would expect that </a:t>
             </a:r>
             <a:r>
               <a:rPr lang="en-US" dirty="0" err="1"/>
@@ -658,7 +634,7 @@
             </a:r>
             <a:r>
               <a:rPr lang="en-US" dirty="0"/>
-              <a:t> workers would be represented in managerial ranks in the same proportion as they are in the workforce but there ‘s a big gap between those two lines, so clearly they’re not.  And is the gap getting any smaller?</a:t>
+              <a:t> workers would be represented in managerial ranks in the same proportion as they are in the workforce but there ‘s a big gap between those two lines, so clearly they’re not.</a:t>
             </a:r>
           </a:p>
         </p:txBody>
@@ -745,17 +721,11 @@
           <a:p>
             <a:r>
               <a:rPr lang="en-US" dirty="0"/>
-              <a:t>To get a sense of that, we looked at what we’re calling advancement ratios—the comparison of share of a particular job category, like managers or professionals, to the population group’s share of the total workforce.  If a group’s share of a job category is at parity with their share of the workforce, the ratio is 100%.  These charts for advancement ratios in 2010 and ten years later show that in most cases women and people of color hold higher level jobs at considerably lower levels than their share of the workforce.</a:t>
+              <a:t>So, we looked at what we’re calling advancement ratios—the comparison of share of a particular job category, like managers or professionals, to the population group’s share of the total workforce.  If a group’s share of a job category is at parity with their share of the workforce, the ratio is 100%.  These charts for advancement ratios in 2010 and for ten years later show that in most cases women and people of color hold higher level jobs at considerably lower levels than their share of the workforce.</a:t>
             </a:r>
           </a:p>
           <a:p>
             <a:endParaRPr lang="en-US" dirty="0"/>
-          </a:p>
-          <a:p>
-            <a:r>
-              <a:rPr lang="en-US" dirty="0"/>
-              <a:t>So are we making any progress?</a:t>
-            </a:r>
           </a:p>
           <a:p>
             <a:endParaRPr lang="en-US" dirty="0"/>
@@ -847,22 +817,20 @@
           <a:p>
             <a:r>
               <a:rPr lang="en-US" dirty="0"/>
-              <a:t>To look at that we determined the change in advancement ratios over time.  In the ten year period between 2010 and 2019, we see almost no gains among women and African-Americans in professional positions (although women were over represented in that category anyway, so it’s not of great concern).  Gains for women, African </a:t>
-            </a:r>
-            <a:r>
-              <a:rPr lang="en-US" dirty="0" err="1"/>
-              <a:t>americans</a:t>
-            </a:r>
+              <a:t>To see how much the gap has closed during the past ten years, we charted the change in advancement ratio from 2010 to 2019. We were also interested to see what the future would look like if these trends continued so we ran linear regression analyses to predict what representation of each group would be in 2030 and then calculated the advancement ratios and expected change between now and then, which is what you’re seeing on the right.  Our model predicts slower progress in a number of categories over the next 11 years than in the past ten.  </a:t>
+            </a:r>
+          </a:p>
+          <a:p>
             <a:r>
               <a:rPr lang="en-US" dirty="0"/>
-              <a:t> and Asians in managerial jobs were quite low for a ten year period, although Latinx have made some inroads.</a:t>
-            </a:r>
-          </a:p>
-          <a:p>
-            <a:endParaRPr lang="en-US" dirty="0"/>
-          </a:p>
-          <a:p>
-            <a:endParaRPr lang="en-US" dirty="0"/>
+              <a:t>	One note about these analyses:  throughout this study we have been interested in the share of jobs held by different demographic groups, so we’ve been dealing with percentages.  There is some question about whether linear regression can be run legitimately on percentages, and we didn’t have time to study the question thoroughly.  So for the purposes of the exercise, we went ahead with them.</a:t>
+            </a:r>
+          </a:p>
+          <a:p>
+            <a:r>
+              <a:rPr lang="en-US" dirty="0"/>
+              <a:t>	Assuming, then, that—as these charts suggest—progress of women and some people of color into higher level positions is slowing, we wanted to know what would need to change in order to speed it up.</a:t>
+            </a:r>
           </a:p>
           <a:p>
             <a:endParaRPr lang="en-US" dirty="0"/>
@@ -954,41 +922,7 @@
           <a:p>
             <a:r>
               <a:rPr lang="en-US" dirty="0"/>
-              <a:t>We were interested to see what the future would look like if these trends continued so we ran linear regression analyses to predict what representation of each group would be in 2030 and then calculated the advancement ratios and expected change between now and then, which is what you’re seeing here.  We put the chart from the previous slide side by side with the chart showing predicted future change in advancement ratios,  and we can see that progress is expected to be slower in a number of categories over the next 11 years than in the past ten.  </a:t>
-            </a:r>
-          </a:p>
-          <a:p>
-            <a:endParaRPr lang="en-US" dirty="0"/>
-          </a:p>
-          <a:p>
-            <a:r>
-              <a:rPr lang="en-US" dirty="0"/>
-              <a:t>One note about the linear </a:t>
-            </a:r>
-            <a:r>
-              <a:rPr lang="en-US" dirty="0" err="1"/>
-              <a:t>regressional</a:t>
-            </a:r>
-            <a:r>
-              <a:rPr lang="en-US" dirty="0"/>
-              <a:t> analyses:  </a:t>
-            </a:r>
-            <a:r>
-              <a:rPr lang="en-US" dirty="0" err="1"/>
-              <a:t>throughtout</a:t>
-            </a:r>
-            <a:r>
-              <a:rPr lang="en-US" dirty="0"/>
-              <a:t> this study we have been interested in the share of jobs held by different demographic groups, so we’ve been dealing with percentages rather than raw numbers.  There is some question about whether linear regression can be run legitimately on percentages, and we didn’t have time to study the question thoroughly.  So for the purposes of the exercise, we went ahead with them.</a:t>
-            </a:r>
-          </a:p>
-          <a:p>
-            <a:endParaRPr lang="en-US" dirty="0"/>
-          </a:p>
-          <a:p>
-            <a:r>
-              <a:rPr lang="en-US" dirty="0"/>
-              <a:t>Assuming, then, that—as these charts suggest—progress of women and people of color into higher level positions will continue to be slow, we wanted to know what would need to change in order to speed it up.</a:t>
+              <a:t>One thing we looked at was education. We don’t have data on the education level of people who hold professional and managerial jobs, but we do know, as illustrated here, that women in the workforce are just about as likely as men to hold bachelor’s degrees and more likely than men to hold advanced degrees.  While 47% of the workforce are women, 49% of those holding bachelors degrees are women and 52.1% of workers with advanced degrees are women.  So it does not seem likely that lack of education is holding women back.</a:t>
             </a:r>
           </a:p>
         </p:txBody>
@@ -1008,7 +942,7 @@
           <a:bodyPr/>
           <a:lstStyle/>
           <a:p>
-            <a:fld id="{72DC4FD8-5136-4541-84B1-E1A2DDB41138}" type="slidenum">
+            <a:fld id="{9C7817B4-9E36-3442-8893-E9EA8BA086CF}" type="slidenum">
               <a:rPr lang="en-US" smtClean="0"/>
               <a:t>5</a:t>
             </a:fld>
@@ -1019,7 +953,102 @@
     </p:spTree>
     <p:extLst>
       <p:ext uri="{BB962C8B-B14F-4D97-AF65-F5344CB8AC3E}">
-        <p14:creationId xmlns:p14="http://schemas.microsoft.com/office/powerpoint/2010/main" val="1828817642"/>
+        <p14:creationId xmlns:p14="http://schemas.microsoft.com/office/powerpoint/2010/main" val="3690326174"/>
+      </p:ext>
+    </p:extLst>
+  </p:cSld>
+  <p:clrMapOvr>
+    <a:masterClrMapping/>
+  </p:clrMapOvr>
+</p:notes>
+</file>
+
+<file path=ppt/notesSlides/notesSlide6.xml><?xml version="1.0" encoding="utf-8"?>
+<p:notes xmlns:a="http://schemas.openxmlformats.org/drawingml/2006/main" xmlns:r="http://schemas.openxmlformats.org/officeDocument/2006/relationships" xmlns:p="http://schemas.openxmlformats.org/presentationml/2006/main">
+  <p:cSld>
+    <p:spTree>
+      <p:nvGrpSpPr>
+        <p:cNvPr id="1" name=""/>
+        <p:cNvGrpSpPr/>
+        <p:nvPr/>
+      </p:nvGrpSpPr>
+      <p:grpSpPr>
+        <a:xfrm>
+          <a:off x="0" y="0"/>
+          <a:ext cx="0" cy="0"/>
+          <a:chOff x="0" y="0"/>
+          <a:chExt cx="0" cy="0"/>
+        </a:xfrm>
+      </p:grpSpPr>
+      <p:sp>
+        <p:nvSpPr>
+          <p:cNvPr id="2" name="Slide Image Placeholder 1"/>
+          <p:cNvSpPr>
+            <a:spLocks noGrp="1" noRot="1" noChangeAspect="1"/>
+          </p:cNvSpPr>
+          <p:nvPr>
+            <p:ph type="sldImg"/>
+          </p:nvPr>
+        </p:nvSpPr>
+        <p:spPr/>
+      </p:sp>
+      <p:sp>
+        <p:nvSpPr>
+          <p:cNvPr id="3" name="Notes Placeholder 2"/>
+          <p:cNvSpPr>
+            <a:spLocks noGrp="1"/>
+          </p:cNvSpPr>
+          <p:nvPr>
+            <p:ph type="body" idx="1"/>
+          </p:nvPr>
+        </p:nvSpPr>
+        <p:spPr/>
+        <p:txBody>
+          <a:bodyPr/>
+          <a:lstStyle/>
+          <a:p>
+            <a:r>
+              <a:rPr lang="en-US" dirty="0"/>
+              <a:t>Overall, you can see that white workers’ share of educational credentials increases as you go up in education level, while that of African-Americans and Latinx decreases.  We know from our previous slides that, on the whole, the share of jobs for people of these ethnicities also decreases as you go up the ladder.  We cannot say that this phenomenon is actually causing </a:t>
+            </a:r>
+            <a:r>
+              <a:rPr lang="en-US" dirty="0" err="1"/>
+              <a:t>poc</a:t>
+            </a:r>
+            <a:r>
+              <a:rPr lang="en-US" dirty="0"/>
+              <a:t> to be underrepresented in higher level jobs, but it is perhaps an area that should be studied in greater detail.</a:t>
+            </a:r>
+          </a:p>
+        </p:txBody>
+      </p:sp>
+      <p:sp>
+        <p:nvSpPr>
+          <p:cNvPr id="4" name="Slide Number Placeholder 3"/>
+          <p:cNvSpPr>
+            <a:spLocks noGrp="1"/>
+          </p:cNvSpPr>
+          <p:nvPr>
+            <p:ph type="sldNum" sz="quarter" idx="5"/>
+          </p:nvPr>
+        </p:nvSpPr>
+        <p:spPr/>
+        <p:txBody>
+          <a:bodyPr/>
+          <a:lstStyle/>
+          <a:p>
+            <a:fld id="{9C7817B4-9E36-3442-8893-E9EA8BA086CF}" type="slidenum">
+              <a:rPr lang="en-US" smtClean="0"/>
+              <a:t>6</a:t>
+            </a:fld>
+            <a:endParaRPr lang="en-US"/>
+          </a:p>
+        </p:txBody>
+      </p:sp>
+    </p:spTree>
+    <p:extLst>
+      <p:ext uri="{BB962C8B-B14F-4D97-AF65-F5344CB8AC3E}">
+        <p14:creationId xmlns:p14="http://schemas.microsoft.com/office/powerpoint/2010/main" val="287455617"/>
       </p:ext>
     </p:extLst>
   </p:cSld>
@@ -1176,7 +1205,7 @@
           <a:p>
             <a:fld id="{877EF6E0-2C0E-4495-974E-61651D867156}" type="datetimeFigureOut">
               <a:rPr lang="en-US" smtClean="0"/>
-              <a:t>9/17/2020</a:t>
+              <a:t>9/18/2020</a:t>
             </a:fld>
             <a:endParaRPr lang="en-US"/>
           </a:p>
@@ -1374,7 +1403,7 @@
           <a:p>
             <a:fld id="{877EF6E0-2C0E-4495-974E-61651D867156}" type="datetimeFigureOut">
               <a:rPr lang="en-US" smtClean="0"/>
-              <a:t>9/17/2020</a:t>
+              <a:t>9/18/2020</a:t>
             </a:fld>
             <a:endParaRPr lang="en-US"/>
           </a:p>
@@ -1582,7 +1611,7 @@
           <a:p>
             <a:fld id="{877EF6E0-2C0E-4495-974E-61651D867156}" type="datetimeFigureOut">
               <a:rPr lang="en-US" smtClean="0"/>
-              <a:t>9/17/2020</a:t>
+              <a:t>9/18/2020</a:t>
             </a:fld>
             <a:endParaRPr lang="en-US"/>
           </a:p>
@@ -1780,7 +1809,7 @@
           <a:p>
             <a:fld id="{877EF6E0-2C0E-4495-974E-61651D867156}" type="datetimeFigureOut">
               <a:rPr lang="en-US" smtClean="0"/>
-              <a:t>9/17/2020</a:t>
+              <a:t>9/18/2020</a:t>
             </a:fld>
             <a:endParaRPr lang="en-US"/>
           </a:p>
@@ -2055,7 +2084,7 @@
           <a:p>
             <a:fld id="{877EF6E0-2C0E-4495-974E-61651D867156}" type="datetimeFigureOut">
               <a:rPr lang="en-US" smtClean="0"/>
-              <a:t>9/17/2020</a:t>
+              <a:t>9/18/2020</a:t>
             </a:fld>
             <a:endParaRPr lang="en-US"/>
           </a:p>
@@ -2320,7 +2349,7 @@
           <a:p>
             <a:fld id="{877EF6E0-2C0E-4495-974E-61651D867156}" type="datetimeFigureOut">
               <a:rPr lang="en-US" smtClean="0"/>
-              <a:t>9/17/2020</a:t>
+              <a:t>9/18/2020</a:t>
             </a:fld>
             <a:endParaRPr lang="en-US"/>
           </a:p>
@@ -2732,7 +2761,7 @@
           <a:p>
             <a:fld id="{877EF6E0-2C0E-4495-974E-61651D867156}" type="datetimeFigureOut">
               <a:rPr lang="en-US" smtClean="0"/>
-              <a:t>9/17/2020</a:t>
+              <a:t>9/18/2020</a:t>
             </a:fld>
             <a:endParaRPr lang="en-US"/>
           </a:p>
@@ -2873,7 +2902,7 @@
           <a:p>
             <a:fld id="{877EF6E0-2C0E-4495-974E-61651D867156}" type="datetimeFigureOut">
               <a:rPr lang="en-US" smtClean="0"/>
-              <a:t>9/17/2020</a:t>
+              <a:t>9/18/2020</a:t>
             </a:fld>
             <a:endParaRPr lang="en-US"/>
           </a:p>
@@ -2986,7 +3015,7 @@
           <a:p>
             <a:fld id="{877EF6E0-2C0E-4495-974E-61651D867156}" type="datetimeFigureOut">
               <a:rPr lang="en-US" smtClean="0"/>
-              <a:t>9/17/2020</a:t>
+              <a:t>9/18/2020</a:t>
             </a:fld>
             <a:endParaRPr lang="en-US"/>
           </a:p>
@@ -3297,7 +3326,7 @@
           <a:p>
             <a:fld id="{877EF6E0-2C0E-4495-974E-61651D867156}" type="datetimeFigureOut">
               <a:rPr lang="en-US" smtClean="0"/>
-              <a:t>9/17/2020</a:t>
+              <a:t>9/18/2020</a:t>
             </a:fld>
             <a:endParaRPr lang="en-US"/>
           </a:p>
@@ -3585,7 +3614,7 @@
           <a:p>
             <a:fld id="{877EF6E0-2C0E-4495-974E-61651D867156}" type="datetimeFigureOut">
               <a:rPr lang="en-US" smtClean="0"/>
-              <a:t>9/17/2020</a:t>
+              <a:t>9/18/2020</a:t>
             </a:fld>
             <a:endParaRPr lang="en-US"/>
           </a:p>
@@ -3826,7 +3855,7 @@
           <a:p>
             <a:fld id="{877EF6E0-2C0E-4495-974E-61651D867156}" type="datetimeFigureOut">
               <a:rPr lang="en-US" smtClean="0"/>
-              <a:t>9/17/2020</a:t>
+              <a:t>9/18/2020</a:t>
             </a:fld>
             <a:endParaRPr lang="en-US"/>
           </a:p>
@@ -4465,11 +4494,17 @@
           </a:xfrm>
         </p:spPr>
         <p:txBody>
-          <a:bodyPr/>
-          <a:lstStyle/>
-          <a:p>
-            <a:r>
-              <a:rPr lang="en-US" dirty="0"/>
+          <a:bodyPr>
+            <a:normAutofit/>
+          </a:bodyPr>
+          <a:lstStyle/>
+          <a:p>
+            <a:r>
+              <a:rPr lang="en-US" sz="4000" b="1" dirty="0">
+                <a:solidFill>
+                  <a:srgbClr val="002060"/>
+                </a:solidFill>
+              </a:rPr>
               <a:t>Representation over past ten years</a:t>
             </a:r>
           </a:p>
@@ -4477,19 +4512,17 @@
       </p:sp>
       <p:pic>
         <p:nvPicPr>
-          <p:cNvPr id="5" name="Content Placeholder 4">
-            <a:extLst>
-              <a:ext uri="{FF2B5EF4-FFF2-40B4-BE49-F238E27FC236}">
-                <a16:creationId xmlns:a16="http://schemas.microsoft.com/office/drawing/2014/main" id="{AA51B55F-FFA4-4A31-A4B2-A44E15C1786A}"/>
+          <p:cNvPr id="22" name="Picture 21">
+            <a:extLst>
+              <a:ext uri="{FF2B5EF4-FFF2-40B4-BE49-F238E27FC236}">
+                <a16:creationId xmlns:a16="http://schemas.microsoft.com/office/drawing/2014/main" id="{8DEAA65E-F8DF-4975-94A5-7208999A7B58}"/>
               </a:ext>
             </a:extLst>
           </p:cNvPr>
           <p:cNvPicPr>
-            <a:picLocks noGrp="1" noChangeAspect="1"/>
+            <a:picLocks noChangeAspect="1"/>
           </p:cNvPicPr>
-          <p:nvPr>
-            <p:ph idx="1"/>
-          </p:nvPr>
+          <p:nvPr/>
         </p:nvPicPr>
         <p:blipFill>
           <a:blip r:embed="rId3">
@@ -4505,41 +4538,8 @@
         </p:blipFill>
         <p:spPr>
           <a:xfrm>
-            <a:off x="1297770" y="985362"/>
-            <a:ext cx="4793952" cy="2936319"/>
-          </a:xfrm>
-        </p:spPr>
-      </p:pic>
-      <p:pic>
-        <p:nvPicPr>
-          <p:cNvPr id="7" name="Picture 6">
-            <a:extLst>
-              <a:ext uri="{FF2B5EF4-FFF2-40B4-BE49-F238E27FC236}">
-                <a16:creationId xmlns:a16="http://schemas.microsoft.com/office/drawing/2014/main" id="{9028F130-BDA4-4896-AD61-6279F4C6D79C}"/>
-              </a:ext>
-            </a:extLst>
-          </p:cNvPr>
-          <p:cNvPicPr>
-            <a:picLocks noChangeAspect="1"/>
-          </p:cNvPicPr>
-          <p:nvPr/>
-        </p:nvPicPr>
-        <p:blipFill>
-          <a:blip r:embed="rId4">
-            <a:extLst>
-              <a:ext uri="{28A0092B-C50C-407E-A947-70E740481C1C}">
-                <a14:useLocalDpi xmlns:a14="http://schemas.microsoft.com/office/drawing/2010/main" val="0"/>
-              </a:ext>
-            </a:extLst>
-          </a:blip>
-          <a:stretch>
-            <a:fillRect/>
-          </a:stretch>
-        </p:blipFill>
-        <p:spPr>
-          <a:xfrm>
-            <a:off x="6327546" y="3805593"/>
-            <a:ext cx="4793952" cy="3052407"/>
+            <a:off x="769485" y="660400"/>
+            <a:ext cx="5023891" cy="3316840"/>
           </a:xfrm>
           <a:prstGeom prst="rect">
             <a:avLst/>
@@ -4548,10 +4548,10 @@
       </p:pic>
       <p:pic>
         <p:nvPicPr>
-          <p:cNvPr id="9" name="Picture 8">
-            <a:extLst>
-              <a:ext uri="{FF2B5EF4-FFF2-40B4-BE49-F238E27FC236}">
-                <a16:creationId xmlns:a16="http://schemas.microsoft.com/office/drawing/2014/main" id="{1990FA27-03EC-4CC8-A7C8-FBCCABD4B0E0}"/>
+          <p:cNvPr id="24" name="Picture 23">
+            <a:extLst>
+              <a:ext uri="{FF2B5EF4-FFF2-40B4-BE49-F238E27FC236}">
+                <a16:creationId xmlns:a16="http://schemas.microsoft.com/office/drawing/2014/main" id="{1C667968-DB20-4477-AD59-A9107320968F}"/>
               </a:ext>
             </a:extLst>
           </p:cNvPr>
@@ -4561,7 +4561,7 @@
           <p:nvPr/>
         </p:nvPicPr>
         <p:blipFill>
-          <a:blip r:embed="rId5">
+          <a:blip r:embed="rId4">
             <a:extLst>
               <a:ext uri="{28A0092B-C50C-407E-A947-70E740481C1C}">
                 <a14:useLocalDpi xmlns:a14="http://schemas.microsoft.com/office/drawing/2010/main" val="0"/>
@@ -4574,8 +4574,8 @@
         </p:blipFill>
         <p:spPr>
           <a:xfrm>
-            <a:off x="6327545" y="982785"/>
-            <a:ext cx="4721717" cy="3051713"/>
+            <a:off x="6593840" y="660400"/>
+            <a:ext cx="4940435" cy="3316840"/>
           </a:xfrm>
           <a:prstGeom prst="rect">
             <a:avLst/>
@@ -4584,10 +4584,46 @@
       </p:pic>
       <p:pic>
         <p:nvPicPr>
-          <p:cNvPr id="11" name="Picture 10">
-            <a:extLst>
-              <a:ext uri="{FF2B5EF4-FFF2-40B4-BE49-F238E27FC236}">
-                <a16:creationId xmlns:a16="http://schemas.microsoft.com/office/drawing/2014/main" id="{A0ADF944-6664-4BCF-8CB1-390CBF2FE25E}"/>
+          <p:cNvPr id="26" name="Picture 25">
+            <a:extLst>
+              <a:ext uri="{FF2B5EF4-FFF2-40B4-BE49-F238E27FC236}">
+                <a16:creationId xmlns:a16="http://schemas.microsoft.com/office/drawing/2014/main" id="{ABC6F876-F825-43B5-B8B3-14297BB47C56}"/>
+              </a:ext>
+            </a:extLst>
+          </p:cNvPr>
+          <p:cNvPicPr>
+            <a:picLocks noChangeAspect="1"/>
+          </p:cNvPicPr>
+          <p:nvPr/>
+        </p:nvPicPr>
+        <p:blipFill>
+          <a:blip r:embed="rId5">
+            <a:extLst>
+              <a:ext uri="{28A0092B-C50C-407E-A947-70E740481C1C}">
+                <a14:useLocalDpi xmlns:a14="http://schemas.microsoft.com/office/drawing/2010/main" val="0"/>
+              </a:ext>
+            </a:extLst>
+          </a:blip>
+          <a:stretch>
+            <a:fillRect/>
+          </a:stretch>
+        </p:blipFill>
+        <p:spPr>
+          <a:xfrm>
+            <a:off x="852942" y="3671129"/>
+            <a:ext cx="4940434" cy="3258421"/>
+          </a:xfrm>
+          <a:prstGeom prst="rect">
+            <a:avLst/>
+          </a:prstGeom>
+        </p:spPr>
+      </p:pic>
+      <p:pic>
+        <p:nvPicPr>
+          <p:cNvPr id="28" name="Picture 27">
+            <a:extLst>
+              <a:ext uri="{FF2B5EF4-FFF2-40B4-BE49-F238E27FC236}">
+                <a16:creationId xmlns:a16="http://schemas.microsoft.com/office/drawing/2014/main" id="{CBE0DA02-8D38-4C2F-A79F-6F42CF41B14A}"/>
               </a:ext>
             </a:extLst>
           </p:cNvPr>
@@ -4610,8 +4646,8 @@
         </p:blipFill>
         <p:spPr>
           <a:xfrm>
-            <a:off x="1302047" y="3921681"/>
-            <a:ext cx="4793952" cy="2936319"/>
+            <a:off x="6593840" y="3671129"/>
+            <a:ext cx="5123315" cy="3200000"/>
           </a:xfrm>
           <a:prstGeom prst="rect">
             <a:avLst/>
@@ -4650,10 +4686,10 @@
       </p:grpSpPr>
       <p:pic>
         <p:nvPicPr>
-          <p:cNvPr id="12" name="Picture 11">
-            <a:extLst>
-              <a:ext uri="{FF2B5EF4-FFF2-40B4-BE49-F238E27FC236}">
-                <a16:creationId xmlns:a16="http://schemas.microsoft.com/office/drawing/2014/main" id="{30A9EFD6-074C-4672-9081-91A1AC975700}"/>
+          <p:cNvPr id="11" name="Picture 10">
+            <a:extLst>
+              <a:ext uri="{FF2B5EF4-FFF2-40B4-BE49-F238E27FC236}">
+                <a16:creationId xmlns:a16="http://schemas.microsoft.com/office/drawing/2014/main" id="{B154CF9A-16CF-4688-B5CF-542EF54EC62C}"/>
               </a:ext>
             </a:extLst>
           </p:cNvPr>
@@ -4676,8 +4712,8 @@
         </p:blipFill>
         <p:spPr>
           <a:xfrm>
-            <a:off x="5713608" y="1574631"/>
-            <a:ext cx="7175198" cy="5022639"/>
+            <a:off x="5676900" y="1143000"/>
+            <a:ext cx="7031600" cy="4922120"/>
           </a:xfrm>
           <a:prstGeom prst="rect">
             <a:avLst/>
@@ -4700,13 +4736,24 @@
             <p:ph type="title"/>
           </p:nvPr>
         </p:nvSpPr>
-        <p:spPr/>
-        <p:txBody>
-          <a:bodyPr/>
-          <a:lstStyle/>
-          <a:p>
-            <a:r>
-              <a:rPr lang="en-US" dirty="0"/>
+        <p:spPr>
+          <a:xfrm>
+            <a:off x="838200" y="249067"/>
+            <a:ext cx="10515600" cy="893933"/>
+          </a:xfrm>
+        </p:spPr>
+        <p:txBody>
+          <a:bodyPr>
+            <a:normAutofit/>
+          </a:bodyPr>
+          <a:lstStyle/>
+          <a:p>
+            <a:r>
+              <a:rPr lang="en-US" sz="4000" b="1" dirty="0">
+                <a:solidFill>
+                  <a:srgbClr val="002060"/>
+                </a:solidFill>
+              </a:rPr>
               <a:t>Advancement Ratios</a:t>
             </a:r>
           </a:p>
@@ -4714,10 +4761,10 @@
       </p:sp>
       <p:pic>
         <p:nvPicPr>
-          <p:cNvPr id="10" name="Picture 9">
-            <a:extLst>
-              <a:ext uri="{FF2B5EF4-FFF2-40B4-BE49-F238E27FC236}">
-                <a16:creationId xmlns:a16="http://schemas.microsoft.com/office/drawing/2014/main" id="{D6472837-F5E9-4D9B-9B95-240CD758237A}"/>
+          <p:cNvPr id="8" name="Picture 7">
+            <a:extLst>
+              <a:ext uri="{FF2B5EF4-FFF2-40B4-BE49-F238E27FC236}">
+                <a16:creationId xmlns:a16="http://schemas.microsoft.com/office/drawing/2014/main" id="{2F38A713-D999-4B60-A2B4-1911F351B04F}"/>
               </a:ext>
             </a:extLst>
           </p:cNvPr>
@@ -4740,8 +4787,8 @@
         </p:blipFill>
         <p:spPr>
           <a:xfrm>
-            <a:off x="-155644" y="1574632"/>
-            <a:ext cx="7175198" cy="5022639"/>
+            <a:off x="-172720" y="1143000"/>
+            <a:ext cx="7031600" cy="4922120"/>
           </a:xfrm>
           <a:prstGeom prst="rect">
             <a:avLst/>
@@ -4778,40 +4825,12 @@
           <a:chExt cx="0" cy="0"/>
         </a:xfrm>
       </p:grpSpPr>
-      <p:sp>
-        <p:nvSpPr>
-          <p:cNvPr id="5" name="Title 4">
-            <a:extLst>
-              <a:ext uri="{FF2B5EF4-FFF2-40B4-BE49-F238E27FC236}">
-                <a16:creationId xmlns:a16="http://schemas.microsoft.com/office/drawing/2014/main" id="{B6DDF487-257B-4C22-86F0-D996E229CF31}"/>
-              </a:ext>
-            </a:extLst>
-          </p:cNvPr>
-          <p:cNvSpPr>
-            <a:spLocks noGrp="1"/>
-          </p:cNvSpPr>
-          <p:nvPr>
-            <p:ph type="title"/>
-          </p:nvPr>
-        </p:nvSpPr>
-        <p:spPr/>
-        <p:txBody>
-          <a:bodyPr/>
-          <a:lstStyle/>
-          <a:p>
-            <a:r>
-              <a:rPr lang="en-US" dirty="0"/>
-              <a:t>Change in Advancement Ratios, 2010 v. 2019</a:t>
-            </a:r>
-          </a:p>
-        </p:txBody>
-      </p:sp>
       <p:pic>
         <p:nvPicPr>
-          <p:cNvPr id="3" name="Picture 2">
-            <a:extLst>
-              <a:ext uri="{FF2B5EF4-FFF2-40B4-BE49-F238E27FC236}">
-                <a16:creationId xmlns:a16="http://schemas.microsoft.com/office/drawing/2014/main" id="{E96136CC-A788-4120-83FA-DFA1AC83C15D}"/>
+          <p:cNvPr id="13" name="Picture 12">
+            <a:extLst>
+              <a:ext uri="{FF2B5EF4-FFF2-40B4-BE49-F238E27FC236}">
+                <a16:creationId xmlns:a16="http://schemas.microsoft.com/office/drawing/2014/main" id="{7042B2CA-F601-4E0A-AB35-9390AD5A2D0F}"/>
               </a:ext>
             </a:extLst>
           </p:cNvPr>
@@ -4834,8 +4853,83 @@
         </p:blipFill>
         <p:spPr>
           <a:xfrm>
-            <a:off x="1433798" y="1243013"/>
-            <a:ext cx="9324403" cy="5719044"/>
+            <a:off x="5669850" y="1146248"/>
+            <a:ext cx="6896902" cy="4827832"/>
+          </a:xfrm>
+          <a:prstGeom prst="rect">
+            <a:avLst/>
+          </a:prstGeom>
+        </p:spPr>
+      </p:pic>
+      <p:sp>
+        <p:nvSpPr>
+          <p:cNvPr id="5" name="Title 4">
+            <a:extLst>
+              <a:ext uri="{FF2B5EF4-FFF2-40B4-BE49-F238E27FC236}">
+                <a16:creationId xmlns:a16="http://schemas.microsoft.com/office/drawing/2014/main" id="{B6DDF487-257B-4C22-86F0-D996E229CF31}"/>
+              </a:ext>
+            </a:extLst>
+          </p:cNvPr>
+          <p:cNvSpPr>
+            <a:spLocks noGrp="1"/>
+          </p:cNvSpPr>
+          <p:nvPr>
+            <p:ph type="title"/>
+          </p:nvPr>
+        </p:nvSpPr>
+        <p:spPr>
+          <a:xfrm>
+            <a:off x="838199" y="0"/>
+            <a:ext cx="10515600" cy="1325563"/>
+          </a:xfrm>
+        </p:spPr>
+        <p:txBody>
+          <a:bodyPr>
+            <a:normAutofit/>
+          </a:bodyPr>
+          <a:lstStyle/>
+          <a:p>
+            <a:r>
+              <a:rPr lang="en-US" sz="4000" b="1" dirty="0">
+                <a:solidFill>
+                  <a:srgbClr val="002060"/>
+                </a:solidFill>
+              </a:rPr>
+              <a:t>Change in Advancement Ratios 2010 to 2030</a:t>
+            </a:r>
+          </a:p>
+        </p:txBody>
+      </p:sp>
+      <p:pic>
+        <p:nvPicPr>
+          <p:cNvPr id="11" name="Picture 10">
+            <a:extLst>
+              <a:ext uri="{FF2B5EF4-FFF2-40B4-BE49-F238E27FC236}">
+                <a16:creationId xmlns:a16="http://schemas.microsoft.com/office/drawing/2014/main" id="{39D5DACD-ADC0-42B8-8D17-E13B5F61715F}"/>
+              </a:ext>
+            </a:extLst>
+          </p:cNvPr>
+          <p:cNvPicPr>
+            <a:picLocks noChangeAspect="1"/>
+          </p:cNvPicPr>
+          <p:nvPr/>
+        </p:nvPicPr>
+        <p:blipFill>
+          <a:blip r:embed="rId4">
+            <a:extLst>
+              <a:ext uri="{28A0092B-C50C-407E-A947-70E740481C1C}">
+                <a14:useLocalDpi xmlns:a14="http://schemas.microsoft.com/office/drawing/2010/main" val="0"/>
+              </a:ext>
+            </a:extLst>
+          </a:blip>
+          <a:stretch>
+            <a:fillRect/>
+          </a:stretch>
+        </p:blipFill>
+        <p:spPr>
+          <a:xfrm>
+            <a:off x="-47975" y="1146248"/>
+            <a:ext cx="6896902" cy="4827832"/>
           </a:xfrm>
           <a:prstGeom prst="rect">
             <a:avLst/>
@@ -4872,40 +4966,12 @@
           <a:chExt cx="0" cy="0"/>
         </a:xfrm>
       </p:grpSpPr>
-      <p:sp>
-        <p:nvSpPr>
-          <p:cNvPr id="2" name="Title 1">
-            <a:extLst>
-              <a:ext uri="{FF2B5EF4-FFF2-40B4-BE49-F238E27FC236}">
-                <a16:creationId xmlns:a16="http://schemas.microsoft.com/office/drawing/2014/main" id="{42ACBFBB-694E-43F5-B863-F9214350368F}"/>
-              </a:ext>
-            </a:extLst>
-          </p:cNvPr>
-          <p:cNvSpPr>
-            <a:spLocks noGrp="1"/>
-          </p:cNvSpPr>
-          <p:nvPr>
-            <p:ph type="title"/>
-          </p:nvPr>
-        </p:nvSpPr>
-        <p:spPr/>
-        <p:txBody>
-          <a:bodyPr/>
-          <a:lstStyle/>
-          <a:p>
-            <a:r>
-              <a:rPr lang="en-US" dirty="0"/>
-              <a:t>Change in Advancement Ratios, 2019 v. 2030</a:t>
-            </a:r>
-          </a:p>
-        </p:txBody>
-      </p:sp>
       <p:pic>
         <p:nvPicPr>
-          <p:cNvPr id="8" name="Picture 7">
-            <a:extLst>
-              <a:ext uri="{FF2B5EF4-FFF2-40B4-BE49-F238E27FC236}">
-                <a16:creationId xmlns:a16="http://schemas.microsoft.com/office/drawing/2014/main" id="{0D4FB909-976E-4C5C-B6FD-7E95C50CD4ED}"/>
+          <p:cNvPr id="5" name="Picture 4">
+            <a:extLst>
+              <a:ext uri="{FF2B5EF4-FFF2-40B4-BE49-F238E27FC236}">
+                <a16:creationId xmlns:a16="http://schemas.microsoft.com/office/drawing/2014/main" id="{847131DE-D6A7-C84F-A6CA-03E0C5041DEE}"/>
               </a:ext>
             </a:extLst>
           </p:cNvPr>
@@ -4915,21 +4981,15 @@
           <p:nvPr/>
         </p:nvPicPr>
         <p:blipFill>
-          <a:blip r:embed="rId3">
-            <a:extLst>
-              <a:ext uri="{28A0092B-C50C-407E-A947-70E740481C1C}">
-                <a14:useLocalDpi xmlns:a14="http://schemas.microsoft.com/office/drawing/2010/main" val="0"/>
-              </a:ext>
-            </a:extLst>
-          </a:blip>
+          <a:blip r:embed="rId3"/>
           <a:stretch>
             <a:fillRect/>
           </a:stretch>
         </p:blipFill>
         <p:spPr>
           <a:xfrm>
-            <a:off x="5693579" y="1582102"/>
-            <a:ext cx="6498421" cy="4648140"/>
+            <a:off x="2041241" y="3716417"/>
+            <a:ext cx="3184182" cy="2299180"/>
           </a:xfrm>
           <a:prstGeom prst="rect">
             <a:avLst/>
@@ -4938,10 +4998,10 @@
       </p:pic>
       <p:pic>
         <p:nvPicPr>
-          <p:cNvPr id="10" name="Picture 9">
-            <a:extLst>
-              <a:ext uri="{FF2B5EF4-FFF2-40B4-BE49-F238E27FC236}">
-                <a16:creationId xmlns:a16="http://schemas.microsoft.com/office/drawing/2014/main" id="{6D7917B8-028A-461D-99BD-80E504A7BC49}"/>
+          <p:cNvPr id="7" name="Picture 6">
+            <a:extLst>
+              <a:ext uri="{FF2B5EF4-FFF2-40B4-BE49-F238E27FC236}">
+                <a16:creationId xmlns:a16="http://schemas.microsoft.com/office/drawing/2014/main" id="{3064D7F6-EA9A-9F45-9A5F-C7D9AF641D03}"/>
               </a:ext>
             </a:extLst>
           </p:cNvPr>
@@ -4951,31 +5011,420 @@
           <p:nvPr/>
         </p:nvPicPr>
         <p:blipFill>
-          <a:blip r:embed="rId4">
-            <a:extLst>
-              <a:ext uri="{28A0092B-C50C-407E-A947-70E740481C1C}">
-                <a14:useLocalDpi xmlns:a14="http://schemas.microsoft.com/office/drawing/2010/main" val="0"/>
-              </a:ext>
-            </a:extLst>
-          </a:blip>
+          <a:blip r:embed="rId4"/>
           <a:stretch>
             <a:fillRect/>
           </a:stretch>
         </p:blipFill>
         <p:spPr>
           <a:xfrm>
-            <a:off x="161048" y="1582102"/>
-            <a:ext cx="6638353" cy="4646847"/>
+            <a:off x="7968780" y="1175439"/>
+            <a:ext cx="3968421" cy="2253561"/>
           </a:xfrm>
           <a:prstGeom prst="rect">
             <a:avLst/>
           </a:prstGeom>
         </p:spPr>
       </p:pic>
+      <p:pic>
+        <p:nvPicPr>
+          <p:cNvPr id="9" name="Picture 8">
+            <a:extLst>
+              <a:ext uri="{FF2B5EF4-FFF2-40B4-BE49-F238E27FC236}">
+                <a16:creationId xmlns:a16="http://schemas.microsoft.com/office/drawing/2014/main" id="{9A134C09-0C68-994C-B89C-179CD0C5AD3A}"/>
+              </a:ext>
+            </a:extLst>
+          </p:cNvPr>
+          <p:cNvPicPr>
+            <a:picLocks noChangeAspect="1"/>
+          </p:cNvPicPr>
+          <p:nvPr/>
+        </p:nvPicPr>
+        <p:blipFill>
+          <a:blip r:embed="rId5"/>
+          <a:stretch>
+            <a:fillRect/>
+          </a:stretch>
+        </p:blipFill>
+        <p:spPr>
+          <a:xfrm>
+            <a:off x="3930692" y="1557602"/>
+            <a:ext cx="3740728" cy="2253561"/>
+          </a:xfrm>
+          <a:prstGeom prst="rect">
+            <a:avLst/>
+          </a:prstGeom>
+        </p:spPr>
+      </p:pic>
+      <p:pic>
+        <p:nvPicPr>
+          <p:cNvPr id="11" name="Picture 10">
+            <a:extLst>
+              <a:ext uri="{FF2B5EF4-FFF2-40B4-BE49-F238E27FC236}">
+                <a16:creationId xmlns:a16="http://schemas.microsoft.com/office/drawing/2014/main" id="{3E3077EC-BA4F-AA48-802B-D110E6D3A84C}"/>
+              </a:ext>
+            </a:extLst>
+          </p:cNvPr>
+          <p:cNvPicPr>
+            <a:picLocks noChangeAspect="1"/>
+          </p:cNvPicPr>
+          <p:nvPr/>
+        </p:nvPicPr>
+        <p:blipFill>
+          <a:blip r:embed="rId6"/>
+          <a:stretch>
+            <a:fillRect/>
+          </a:stretch>
+        </p:blipFill>
+        <p:spPr>
+          <a:xfrm>
+            <a:off x="390705" y="1175439"/>
+            <a:ext cx="3184181" cy="2253561"/>
+          </a:xfrm>
+          <a:prstGeom prst="rect">
+            <a:avLst/>
+          </a:prstGeom>
+        </p:spPr>
+      </p:pic>
+      <p:pic>
+        <p:nvPicPr>
+          <p:cNvPr id="13" name="Picture 12">
+            <a:extLst>
+              <a:ext uri="{FF2B5EF4-FFF2-40B4-BE49-F238E27FC236}">
+                <a16:creationId xmlns:a16="http://schemas.microsoft.com/office/drawing/2014/main" id="{A65B5244-A0F9-D14B-86F5-B94D9BC1C75D}"/>
+              </a:ext>
+            </a:extLst>
+          </p:cNvPr>
+          <p:cNvPicPr>
+            <a:picLocks noChangeAspect="1"/>
+          </p:cNvPicPr>
+          <p:nvPr/>
+        </p:nvPicPr>
+        <p:blipFill>
+          <a:blip r:embed="rId7"/>
+          <a:stretch>
+            <a:fillRect/>
+          </a:stretch>
+        </p:blipFill>
+        <p:spPr>
+          <a:xfrm>
+            <a:off x="6966579" y="3716417"/>
+            <a:ext cx="3184180" cy="2290055"/>
+          </a:xfrm>
+          <a:prstGeom prst="rect">
+            <a:avLst/>
+          </a:prstGeom>
+        </p:spPr>
+      </p:pic>
+      <p:sp>
+        <p:nvSpPr>
+          <p:cNvPr id="21" name="Title 1">
+            <a:extLst>
+              <a:ext uri="{FF2B5EF4-FFF2-40B4-BE49-F238E27FC236}">
+                <a16:creationId xmlns:a16="http://schemas.microsoft.com/office/drawing/2014/main" id="{049E9301-BF16-CF4F-A8C7-0B05B5AF81F0}"/>
+              </a:ext>
+            </a:extLst>
+          </p:cNvPr>
+          <p:cNvSpPr txBox="1">
+            <a:spLocks/>
+          </p:cNvSpPr>
+          <p:nvPr/>
+        </p:nvSpPr>
+        <p:spPr>
+          <a:xfrm>
+            <a:off x="838200" y="211495"/>
+            <a:ext cx="10515600" cy="1325563"/>
+          </a:xfrm>
+          <a:prstGeom prst="rect">
+            <a:avLst/>
+          </a:prstGeom>
+        </p:spPr>
+        <p:txBody>
+          <a:bodyPr vert="horz" lIns="91440" tIns="45720" rIns="91440" bIns="45720" rtlCol="0" anchor="b">
+            <a:noAutofit/>
+          </a:bodyPr>
+          <a:lstStyle>
+            <a:lvl1pPr algn="ctr" defTabSz="914400" rtl="0" eaLnBrk="1" latinLnBrk="0" hangingPunct="1">
+              <a:lnSpc>
+                <a:spcPct val="90000"/>
+              </a:lnSpc>
+              <a:spcBef>
+                <a:spcPct val="0"/>
+              </a:spcBef>
+              <a:buNone/>
+              <a:defRPr sz="6000" kern="1200">
+                <a:solidFill>
+                  <a:schemeClr val="tx1"/>
+                </a:solidFill>
+                <a:latin typeface="+mj-lt"/>
+                <a:ea typeface="+mj-ea"/>
+                <a:cs typeface="+mj-cs"/>
+              </a:defRPr>
+            </a:lvl1pPr>
+          </a:lstStyle>
+          <a:p>
+            <a:pPr algn="l"/>
+            <a:r>
+              <a:rPr lang="en-US" sz="4000" b="1" dirty="0">
+                <a:solidFill>
+                  <a:srgbClr val="002060"/>
+                </a:solidFill>
+              </a:rPr>
+              <a:t>Education levels for male &amp; female workers, 2019</a:t>
+            </a:r>
+            <a:br>
+              <a:rPr lang="en-US" sz="3600" dirty="0"/>
+            </a:br>
+            <a:endParaRPr lang="en-US" sz="3600" dirty="0"/>
+          </a:p>
+        </p:txBody>
+      </p:sp>
     </p:spTree>
     <p:extLst>
       <p:ext uri="{BB962C8B-B14F-4D97-AF65-F5344CB8AC3E}">
-        <p14:creationId xmlns:p14="http://schemas.microsoft.com/office/powerpoint/2010/main" val="3246847237"/>
+        <p14:creationId xmlns:p14="http://schemas.microsoft.com/office/powerpoint/2010/main" val="3376003279"/>
+      </p:ext>
+    </p:extLst>
+  </p:cSld>
+  <p:clrMapOvr>
+    <a:masterClrMapping/>
+  </p:clrMapOvr>
+</p:sld>
+</file>
+
+<file path=ppt/slides/slide6.xml><?xml version="1.0" encoding="utf-8"?>
+<p:sld xmlns:a="http://schemas.openxmlformats.org/drawingml/2006/main" xmlns:r="http://schemas.openxmlformats.org/officeDocument/2006/relationships" xmlns:p="http://schemas.openxmlformats.org/presentationml/2006/main">
+  <p:cSld>
+    <p:spTree>
+      <p:nvGrpSpPr>
+        <p:cNvPr id="1" name=""/>
+        <p:cNvGrpSpPr/>
+        <p:nvPr/>
+      </p:nvGrpSpPr>
+      <p:grpSpPr>
+        <a:xfrm>
+          <a:off x="0" y="0"/>
+          <a:ext cx="0" cy="0"/>
+          <a:chOff x="0" y="0"/>
+          <a:chExt cx="0" cy="0"/>
+        </a:xfrm>
+      </p:grpSpPr>
+      <p:pic>
+        <p:nvPicPr>
+          <p:cNvPr id="5" name="Content Placeholder 4">
+            <a:extLst>
+              <a:ext uri="{FF2B5EF4-FFF2-40B4-BE49-F238E27FC236}">
+                <a16:creationId xmlns:a16="http://schemas.microsoft.com/office/drawing/2014/main" id="{184454C7-C743-D446-87E0-9F09ACF1385A}"/>
+              </a:ext>
+            </a:extLst>
+          </p:cNvPr>
+          <p:cNvPicPr>
+            <a:picLocks noGrp="1" noChangeAspect="1"/>
+          </p:cNvPicPr>
+          <p:nvPr>
+            <p:ph idx="1"/>
+          </p:nvPr>
+        </p:nvPicPr>
+        <p:blipFill>
+          <a:blip r:embed="rId3"/>
+          <a:stretch>
+            <a:fillRect/>
+          </a:stretch>
+        </p:blipFill>
+        <p:spPr>
+          <a:xfrm>
+            <a:off x="7087413" y="3989905"/>
+            <a:ext cx="3227367" cy="2321115"/>
+          </a:xfrm>
+        </p:spPr>
+      </p:pic>
+      <p:pic>
+        <p:nvPicPr>
+          <p:cNvPr id="7" name="Picture 6">
+            <a:extLst>
+              <a:ext uri="{FF2B5EF4-FFF2-40B4-BE49-F238E27FC236}">
+                <a16:creationId xmlns:a16="http://schemas.microsoft.com/office/drawing/2014/main" id="{3EC6D334-D1A2-E747-B41E-E2AA94EB32B3}"/>
+              </a:ext>
+            </a:extLst>
+          </p:cNvPr>
+          <p:cNvPicPr>
+            <a:picLocks noChangeAspect="1"/>
+          </p:cNvPicPr>
+          <p:nvPr/>
+        </p:nvPicPr>
+        <p:blipFill>
+          <a:blip r:embed="rId4"/>
+          <a:stretch>
+            <a:fillRect/>
+          </a:stretch>
+        </p:blipFill>
+        <p:spPr>
+          <a:xfrm>
+            <a:off x="1864312" y="3989906"/>
+            <a:ext cx="3240277" cy="2321115"/>
+          </a:xfrm>
+          <a:prstGeom prst="rect">
+            <a:avLst/>
+          </a:prstGeom>
+        </p:spPr>
+      </p:pic>
+      <p:pic>
+        <p:nvPicPr>
+          <p:cNvPr id="9" name="Picture 8">
+            <a:extLst>
+              <a:ext uri="{FF2B5EF4-FFF2-40B4-BE49-F238E27FC236}">
+                <a16:creationId xmlns:a16="http://schemas.microsoft.com/office/drawing/2014/main" id="{68703982-0FED-2545-ABEB-F2E312E2ABB3}"/>
+              </a:ext>
+            </a:extLst>
+          </p:cNvPr>
+          <p:cNvPicPr>
+            <a:picLocks noChangeAspect="1"/>
+          </p:cNvPicPr>
+          <p:nvPr/>
+        </p:nvPicPr>
+        <p:blipFill>
+          <a:blip r:embed="rId5"/>
+          <a:stretch>
+            <a:fillRect/>
+          </a:stretch>
+        </p:blipFill>
+        <p:spPr>
+          <a:xfrm>
+            <a:off x="7790112" y="1248129"/>
+            <a:ext cx="4134126" cy="2260710"/>
+          </a:xfrm>
+          <a:prstGeom prst="rect">
+            <a:avLst/>
+          </a:prstGeom>
+        </p:spPr>
+      </p:pic>
+      <p:pic>
+        <p:nvPicPr>
+          <p:cNvPr id="11" name="Picture 10">
+            <a:extLst>
+              <a:ext uri="{FF2B5EF4-FFF2-40B4-BE49-F238E27FC236}">
+                <a16:creationId xmlns:a16="http://schemas.microsoft.com/office/drawing/2014/main" id="{AA26836C-68DF-3743-96EE-5FB1FFDAD89C}"/>
+              </a:ext>
+            </a:extLst>
+          </p:cNvPr>
+          <p:cNvPicPr>
+            <a:picLocks noChangeAspect="1"/>
+          </p:cNvPicPr>
+          <p:nvPr/>
+        </p:nvPicPr>
+        <p:blipFill>
+          <a:blip r:embed="rId6"/>
+          <a:stretch>
+            <a:fillRect/>
+          </a:stretch>
+        </p:blipFill>
+        <p:spPr>
+          <a:xfrm>
+            <a:off x="4114781" y="1633491"/>
+            <a:ext cx="3857573" cy="2279890"/>
+          </a:xfrm>
+          <a:prstGeom prst="rect">
+            <a:avLst/>
+          </a:prstGeom>
+        </p:spPr>
+      </p:pic>
+      <p:pic>
+        <p:nvPicPr>
+          <p:cNvPr id="13" name="Picture 12">
+            <a:extLst>
+              <a:ext uri="{FF2B5EF4-FFF2-40B4-BE49-F238E27FC236}">
+                <a16:creationId xmlns:a16="http://schemas.microsoft.com/office/drawing/2014/main" id="{9EACB995-464A-C943-8EAD-CA5A612C0534}"/>
+              </a:ext>
+            </a:extLst>
+          </p:cNvPr>
+          <p:cNvPicPr>
+            <a:picLocks noChangeAspect="1"/>
+          </p:cNvPicPr>
+          <p:nvPr/>
+        </p:nvPicPr>
+        <p:blipFill>
+          <a:blip r:embed="rId7"/>
+          <a:stretch>
+            <a:fillRect/>
+          </a:stretch>
+        </p:blipFill>
+        <p:spPr>
+          <a:xfrm>
+            <a:off x="222607" y="1357797"/>
+            <a:ext cx="3780053" cy="2260710"/>
+          </a:xfrm>
+          <a:prstGeom prst="rect">
+            <a:avLst/>
+          </a:prstGeom>
+        </p:spPr>
+      </p:pic>
+      <p:sp>
+        <p:nvSpPr>
+          <p:cNvPr id="14" name="Title 1">
+            <a:extLst>
+              <a:ext uri="{FF2B5EF4-FFF2-40B4-BE49-F238E27FC236}">
+                <a16:creationId xmlns:a16="http://schemas.microsoft.com/office/drawing/2014/main" id="{DED7BF9A-EF5F-E84B-8DCA-1DCADE2EF247}"/>
+              </a:ext>
+            </a:extLst>
+          </p:cNvPr>
+          <p:cNvSpPr txBox="1">
+            <a:spLocks/>
+          </p:cNvSpPr>
+          <p:nvPr/>
+        </p:nvSpPr>
+        <p:spPr>
+          <a:xfrm>
+            <a:off x="838200" y="546979"/>
+            <a:ext cx="10515600" cy="1086512"/>
+          </a:xfrm>
+          <a:prstGeom prst="rect">
+            <a:avLst/>
+          </a:prstGeom>
+        </p:spPr>
+        <p:txBody>
+          <a:bodyPr vert="horz" lIns="91440" tIns="45720" rIns="91440" bIns="45720" rtlCol="0" anchor="b">
+            <a:noAutofit/>
+          </a:bodyPr>
+          <a:lstStyle>
+            <a:lvl1pPr algn="ctr" defTabSz="914400" rtl="0" eaLnBrk="1" latinLnBrk="0" hangingPunct="1">
+              <a:lnSpc>
+                <a:spcPct val="90000"/>
+              </a:lnSpc>
+              <a:spcBef>
+                <a:spcPct val="0"/>
+              </a:spcBef>
+              <a:buNone/>
+              <a:defRPr sz="6000" kern="1200">
+                <a:solidFill>
+                  <a:schemeClr val="tx1"/>
+                </a:solidFill>
+                <a:latin typeface="+mj-lt"/>
+                <a:ea typeface="+mj-ea"/>
+                <a:cs typeface="+mj-cs"/>
+              </a:defRPr>
+            </a:lvl1pPr>
+          </a:lstStyle>
+          <a:p>
+            <a:pPr algn="l"/>
+            <a:r>
+              <a:rPr lang="en-US" sz="4000" b="1" dirty="0">
+                <a:solidFill>
+                  <a:srgbClr val="002060"/>
+                </a:solidFill>
+              </a:rPr>
+              <a:t>Education levels for POC, 2019</a:t>
+            </a:r>
+            <a:br>
+              <a:rPr lang="en-US" sz="3600" dirty="0"/>
+            </a:br>
+            <a:endParaRPr lang="en-US" sz="3600" dirty="0"/>
+          </a:p>
+        </p:txBody>
+      </p:sp>
+    </p:spTree>
+    <p:extLst>
+      <p:ext uri="{BB962C8B-B14F-4D97-AF65-F5344CB8AC3E}">
+        <p14:creationId xmlns:p14="http://schemas.microsoft.com/office/powerpoint/2010/main" val="2468547755"/>
       </p:ext>
     </p:extLst>
   </p:cSld>

</xml_diff>